<commit_message>
minor changes in templates
</commit_message>
<xml_diff>
--- a/logo/eazy2bizlogo.pptx
+++ b/logo/eazy2bizlogo.pptx
@@ -11617,7 +11617,7 @@
         </p:nvSpPr>
         <p:spPr>
           <a:xfrm>
-            <a:off x="5332900" y="4752375"/>
+            <a:off x="5017590" y="4699823"/>
             <a:ext cx="2794500" cy="400200"/>
           </a:xfrm>
           <a:prstGeom prst="rect">
@@ -11644,15 +11644,24 @@
               <a:buNone/>
             </a:pPr>
             <a:r>
-              <a:rPr lang="en-US">
+              <a:rPr lang="en-US" dirty="0" err="1">
                 <a:latin typeface="Calibri"/>
                 <a:ea typeface="Calibri"/>
                 <a:cs typeface="Calibri"/>
                 <a:sym typeface="Calibri"/>
               </a:rPr>
-              <a:t>blenda script</a:t>
+              <a:t>blenda</a:t>
             </a:r>
-            <a:endParaRPr>
+            <a:r>
+              <a:rPr lang="en-US" dirty="0">
+                <a:latin typeface="Calibri"/>
+                <a:ea typeface="Calibri"/>
+                <a:cs typeface="Calibri"/>
+                <a:sym typeface="Calibri"/>
+              </a:rPr>
+              <a:t> script</a:t>
+            </a:r>
+            <a:endParaRPr dirty="0">
               <a:latin typeface="Calibri"/>
               <a:ea typeface="Calibri"/>
               <a:cs typeface="Calibri"/>

</xml_diff>